<commit_message>
rubah format laporan LA
</commit_message>
<xml_diff>
--- a/Si Dian.pptx
+++ b/Si Dian.pptx
@@ -11468,7 +11468,7 @@
                   <a:srgbClr val="37517E"/>
                 </a:solidFill>
               </a:rPr>
-              <a:t>menjawab</a:t>
+              <a:t>memberikan</a:t>
             </a:r>
             <a:r>
               <a:rPr lang="en-US" sz="3600" b="0" dirty="0">
@@ -11484,23 +11484,7 @@
                   <a:srgbClr val="37517E"/>
                 </a:solidFill>
               </a:rPr>
-              <a:t>itu</a:t>
-            </a:r>
-            <a:r>
-              <a:rPr lang="en-US" sz="3600" b="0" dirty="0">
-                <a:solidFill>
-                  <a:srgbClr val="37517E"/>
-                </a:solidFill>
-              </a:rPr>
-              <a:t> </a:t>
-            </a:r>
-            <a:r>
-              <a:rPr lang="en-US" sz="3600" b="0" dirty="0" err="1">
-                <a:solidFill>
-                  <a:srgbClr val="37517E"/>
-                </a:solidFill>
-              </a:rPr>
-              <a:t>semua</a:t>
+              <a:t>solusi</a:t>
             </a:r>
             <a:endParaRPr lang="id-ID" sz="3200" b="0" dirty="0">
               <a:solidFill>

</xml_diff>

<commit_message>
add cover buku panduan + penambahan laporan
</commit_message>
<xml_diff>
--- a/Si Dian.pptx
+++ b/Si Dian.pptx
@@ -8609,8 +8609,8 @@
         </p:nvSpPr>
         <p:spPr>
           <a:xfrm>
-            <a:off x="-213360" y="4686300"/>
-            <a:ext cx="9425940" cy="601980"/>
+            <a:off x="0" y="4686300"/>
+            <a:ext cx="9144000" cy="601980"/>
           </a:xfrm>
           <a:prstGeom prst="rect">
             <a:avLst/>
@@ -8661,8 +8661,8 @@
         </p:nvSpPr>
         <p:spPr>
           <a:xfrm>
-            <a:off x="-213360" y="-265321"/>
-            <a:ext cx="9425940" cy="601980"/>
+            <a:off x="0" y="-265321"/>
+            <a:ext cx="9144000" cy="595481"/>
           </a:xfrm>
           <a:prstGeom prst="rect">
             <a:avLst/>

</xml_diff>